<commit_message>
add app link to ppt
</commit_message>
<xml_diff>
--- a/State of the Sun_Group1 PPT_032018.pptx
+++ b/State of the Sun_Group1 PPT_032018.pptx
@@ -238,7 +238,7 @@
           <a:p>
             <a:fld id="{20EA5F0D-C1DC-412F-A146-DDB3A74B588F}" type="datetimeFigureOut">
               <a:rPr lang="en-US"/>
-              <a:t>3/20/2018</a:t>
+              <a:t>3/24/2018</a:t>
             </a:fld>
             <a:endParaRPr/>
           </a:p>
@@ -403,7 +403,7 @@
           <a:p>
             <a:fld id="{A8CDE508-72C8-4AB5-AA9C-1584D31690E0}" type="datetimeFigureOut">
               <a:rPr lang="en-US"/>
-              <a:t>3/20/2018</a:t>
+              <a:t>3/24/2018</a:t>
             </a:fld>
             <a:endParaRPr/>
           </a:p>
@@ -1383,7 +1383,7 @@
             <a:fld id="{B61BEF0D-F0BB-DE4B-95CE-6DB70DBA9567}" type="datetimeFigureOut">
               <a:rPr lang="en-US" smtClean="0"/>
               <a:pPr/>
-              <a:t>3/20/2018</a:t>
+              <a:t>3/24/2018</a:t>
             </a:fld>
             <a:endParaRPr lang="en-US" dirty="0"/>
           </a:p>
@@ -1566,7 +1566,7 @@
           <a:p>
             <a:fld id="{9E583DDF-CA54-461A-A486-592D2374C532}" type="datetimeFigureOut">
               <a:rPr lang="en-US" smtClean="0"/>
-              <a:t>3/20/2018</a:t>
+              <a:t>3/24/2018</a:t>
             </a:fld>
             <a:endParaRPr lang="en-US"/>
           </a:p>
@@ -1801,7 +1801,7 @@
           <a:p>
             <a:fld id="{9E583DDF-CA54-461A-A486-592D2374C532}" type="datetimeFigureOut">
               <a:rPr lang="en-US" smtClean="0"/>
-              <a:t>3/20/2018</a:t>
+              <a:t>3/24/2018</a:t>
             </a:fld>
             <a:endParaRPr lang="en-US"/>
           </a:p>
@@ -1993,7 +1993,7 @@
           <a:p>
             <a:fld id="{9E583DDF-CA54-461A-A486-592D2374C532}" type="datetimeFigureOut">
               <a:rPr lang="en-US" smtClean="0"/>
-              <a:t>3/20/2018</a:t>
+              <a:t>3/24/2018</a:t>
             </a:fld>
             <a:endParaRPr lang="en-US" dirty="0"/>
           </a:p>
@@ -2311,7 +2311,7 @@
           <a:p>
             <a:fld id="{9E583DDF-CA54-461A-A486-592D2374C532}" type="datetimeFigureOut">
               <a:rPr lang="en-US" smtClean="0"/>
-              <a:t>3/20/2018</a:t>
+              <a:t>3/24/2018</a:t>
             </a:fld>
             <a:endParaRPr lang="en-US"/>
           </a:p>
@@ -2627,7 +2627,7 @@
           <a:p>
             <a:fld id="{9DD7D43D-6574-4C7B-808D-C6C12215A4D4}" type="datetimeFigureOut">
               <a:rPr lang="en-US" smtClean="0"/>
-              <a:t>3/20/2018</a:t>
+              <a:t>3/24/2018</a:t>
             </a:fld>
             <a:endParaRPr lang="en-US"/>
           </a:p>
@@ -3061,7 +3061,7 @@
           <a:p>
             <a:fld id="{9E583DDF-CA54-461A-A486-592D2374C532}" type="datetimeFigureOut">
               <a:rPr lang="en-US" smtClean="0"/>
-              <a:t>3/20/2018</a:t>
+              <a:t>3/24/2018</a:t>
             </a:fld>
             <a:endParaRPr lang="en-US"/>
           </a:p>
@@ -3191,7 +3191,7 @@
           <a:p>
             <a:fld id="{9E583DDF-CA54-461A-A486-592D2374C532}" type="datetimeFigureOut">
               <a:rPr lang="en-US" smtClean="0"/>
-              <a:t>3/20/2018</a:t>
+              <a:t>3/24/2018</a:t>
             </a:fld>
             <a:endParaRPr lang="en-US"/>
           </a:p>
@@ -3299,7 +3299,7 @@
             <a:fld id="{9E583DDF-CA54-461A-A486-592D2374C532}" type="datetimeFigureOut">
               <a:rPr lang="en-US" smtClean="0"/>
               <a:pPr/>
-              <a:t>3/20/2018</a:t>
+              <a:t>3/24/2018</a:t>
             </a:fld>
             <a:endParaRPr lang="en-US"/>
           </a:p>
@@ -3585,7 +3585,7 @@
           <a:p>
             <a:fld id="{9E583DDF-CA54-461A-A486-592D2374C532}" type="datetimeFigureOut">
               <a:rPr lang="en-US" smtClean="0"/>
-              <a:t>3/20/2018</a:t>
+              <a:t>3/24/2018</a:t>
             </a:fld>
             <a:endParaRPr lang="en-US"/>
           </a:p>
@@ -3862,7 +3862,7 @@
           <a:p>
             <a:fld id="{9E583DDF-CA54-461A-A486-592D2374C532}" type="datetimeFigureOut">
               <a:rPr lang="en-US" smtClean="0"/>
-              <a:t>3/20/2018</a:t>
+              <a:t>3/24/2018</a:t>
             </a:fld>
             <a:endParaRPr lang="en-US"/>
           </a:p>
@@ -4124,7 +4124,7 @@
             <a:fld id="{9E583DDF-CA54-461A-A486-592D2374C532}" type="datetimeFigureOut">
               <a:rPr lang="en-US" smtClean="0"/>
               <a:pPr/>
-              <a:t>3/20/2018</a:t>
+              <a:t>3/24/2018</a:t>
             </a:fld>
             <a:endParaRPr lang="en-US" dirty="0"/>
           </a:p>
@@ -4848,13 +4848,13 @@
   <p:clrMapOvr>
     <a:masterClrMapping/>
   </p:clrMapOvr>
-  <mc:AlternateContent xmlns:mc="http://schemas.openxmlformats.org/markup-compatibility/2006">
-    <mc:Choice xmlns:p14="http://schemas.microsoft.com/office/powerpoint/2010/main" Requires="p14">
+  <mc:AlternateContent xmlns:mc="http://schemas.openxmlformats.org/markup-compatibility/2006" xmlns:p14="http://schemas.microsoft.com/office/powerpoint/2010/main">
+    <mc:Choice Requires="p14">
       <p:transition spd="med" p14:dur="700">
         <p:fade/>
       </p:transition>
     </mc:Choice>
-    <mc:Fallback>
+    <mc:Fallback xmlns="">
       <p:transition spd="med">
         <p:fade/>
       </p:transition>
@@ -7704,10 +7704,10 @@
       </p:sp>
       <p:sp>
         <p:nvSpPr>
-          <p:cNvPr id="3" name="Content Placeholder 2">
+          <p:cNvPr id="6" name="Content Placeholder 2">
             <a:extLst>
               <a:ext uri="{FF2B5EF4-FFF2-40B4-BE49-F238E27FC236}">
-                <a16:creationId xmlns:a16="http://schemas.microsoft.com/office/drawing/2014/main" id="{695AA8A3-ECEB-4623-8F55-4E0C1490DF04}"/>
+                <a16:creationId xmlns:a16="http://schemas.microsoft.com/office/drawing/2014/main" id="{D191A9ED-28A6-4E37-A4A7-6E679B3B5149}"/>
               </a:ext>
             </a:extLst>
           </p:cNvPr>
@@ -7718,10 +7718,15 @@
             <p:ph idx="1"/>
           </p:nvPr>
         </p:nvSpPr>
-        <p:spPr/>
+        <p:spPr>
+          <a:xfrm>
+            <a:off x="1066800" y="2057400"/>
+            <a:ext cx="9784080" cy="4206240"/>
+          </a:xfrm>
+        </p:spPr>
         <p:txBody>
           <a:bodyPr>
-            <a:normAutofit lnSpcReduction="10000"/>
+            <a:normAutofit fontScale="62500" lnSpcReduction="20000"/>
           </a:bodyPr>
           <a:lstStyle/>
           <a:p>
@@ -7737,6 +7742,18 @@
             <a:endParaRPr lang="en-US" dirty="0"/>
           </a:p>
           <a:p>
+            <a:pPr marL="0" indent="0" algn="ctr">
+              <a:buNone/>
+            </a:pPr>
+            <a:r>
+              <a:rPr lang="en-US" sz="9400" dirty="0">
+                <a:hlinkClick r:id="rId2"/>
+              </a:rPr>
+              <a:t>State of the Sun</a:t>
+            </a:r>
+            <a:endParaRPr lang="en-US" sz="9400" dirty="0"/>
+          </a:p>
+          <a:p>
             <a:pPr marL="0" indent="0">
               <a:buNone/>
             </a:pPr>
@@ -7776,9 +7793,15 @@
             <a:pPr marL="0" indent="0">
               <a:buNone/>
             </a:pPr>
-            <a:r>
-              <a:rPr lang="en-US" dirty="0"/>
-              <a:t>(Why are you still here)</a:t>
+            <a:endParaRPr lang="en-US" dirty="0"/>
+          </a:p>
+          <a:p>
+            <a:pPr marL="0" indent="0">
+              <a:buNone/>
+            </a:pPr>
+            <a:r>
+              <a:rPr lang="en-US" sz="2900" dirty="0"/>
+              <a:t>(Why are you still here?)</a:t>
             </a:r>
           </a:p>
         </p:txBody>

</xml_diff>

<commit_message>
correct slide 6 text spacing
</commit_message>
<xml_diff>
--- a/State of the Sun_Group1 PPT_032018.pptx
+++ b/State of the Sun_Group1 PPT_032018.pptx
@@ -6579,7 +6579,7 @@
         </p:blipFill>
         <p:spPr>
           <a:xfrm>
-            <a:off x="6094959" y="2438400"/>
+            <a:off x="5562600" y="2473036"/>
             <a:ext cx="4031488" cy="3779520"/>
           </a:xfrm>
           <a:prstGeom prst="rect">
@@ -6608,7 +6608,7 @@
         </p:blipFill>
         <p:spPr>
           <a:xfrm>
-            <a:off x="609600" y="2575560"/>
+            <a:off x="375712" y="2603269"/>
             <a:ext cx="4819650" cy="3505200"/>
           </a:xfrm>
           <a:prstGeom prst="rect">
@@ -6632,7 +6632,7 @@
         </p:nvSpPr>
         <p:spPr>
           <a:xfrm>
-            <a:off x="10363200" y="3124200"/>
+            <a:off x="9905908" y="2961945"/>
             <a:ext cx="3445281" cy="4206240"/>
           </a:xfrm>
           <a:prstGeom prst="rect">

</xml_diff>